<commit_message>
PPT & PDF Update
</commit_message>
<xml_diff>
--- a/docs/FSharp.pptx
+++ b/docs/FSharp.pptx
@@ -3235,11 +3235,7 @@
             </a:r>
             <a:r>
               <a:rPr lang="hu-HU" dirty="0" smtClean="0"/>
-              <a:t>. </a:t>
-            </a:r>
-            <a:r>
-              <a:rPr lang="hu-HU" dirty="0" smtClean="0"/>
-              <a:t>JavaScript</a:t>
+              <a:t>. JavaScript</a:t>
             </a:r>
           </a:p>
           <a:p>
@@ -3607,6 +3603,18 @@
               <a:rPr lang="hu-HU" dirty="0" err="1" smtClean="0"/>
               <a:t>side</a:t>
             </a:r>
+            <a:r>
+              <a:rPr lang="hu-HU" dirty="0" smtClean="0"/>
+              <a:t> (</a:t>
+            </a:r>
+            <a:r>
+              <a:rPr lang="hu-HU" dirty="0" err="1" smtClean="0"/>
+              <a:t>Turing-machine</a:t>
+            </a:r>
+            <a:r>
+              <a:rPr lang="hu-HU" dirty="0" smtClean="0"/>
+              <a:t>)</a:t>
+            </a:r>
             <a:endParaRPr lang="hu-HU" dirty="0" smtClean="0"/>
           </a:p>
           <a:p>
@@ -3684,6 +3692,22 @@
               <a:rPr lang="hu-HU" dirty="0" err="1" smtClean="0"/>
               <a:t>side</a:t>
             </a:r>
+            <a:r>
+              <a:rPr lang="hu-HU" dirty="0" smtClean="0"/>
+              <a:t> (</a:t>
+            </a:r>
+            <a:r>
+              <a:rPr lang="el-GR" dirty="0"/>
+              <a:t>λ</a:t>
+            </a:r>
+            <a:r>
+              <a:rPr lang="hu-HU" dirty="0" err="1" smtClean="0"/>
+              <a:t>-calculus</a:t>
+            </a:r>
+            <a:r>
+              <a:rPr lang="hu-HU" smtClean="0"/>
+              <a:t>)</a:t>
+            </a:r>
             <a:endParaRPr lang="hu-HU" dirty="0" smtClean="0"/>
           </a:p>
           <a:p>
@@ -3696,28 +3720,18 @@
             <a:r>
               <a:rPr lang="hu-HU" dirty="0" smtClean="0"/>
               <a:t>	</a:t>
-            </a:r>
-            <a:r>
-              <a:rPr lang="el-GR" dirty="0" smtClean="0"/>
-              <a:t>λ</a:t>
-            </a:r>
-            <a:r>
-              <a:rPr lang="hu-HU" dirty="0" err="1" smtClean="0"/>
-              <a:t>-</a:t>
-            </a:r>
-            <a:r>
-              <a:rPr lang="hu-HU" dirty="0" err="1" smtClean="0"/>
-              <a:t>calculus</a:t>
-            </a:r>
-            <a:r>
-              <a:rPr lang="hu-HU" dirty="0" smtClean="0"/>
-              <a:t> </a:t>
             </a:r>
             <a:r>
               <a:rPr lang="hu-HU" dirty="0" smtClean="0">
                 <a:sym typeface="Wingdings" panose="05000000000000000000" pitchFamily="2" charset="2"/>
               </a:rPr>
-              <a:t> IPL  LISP </a:t>
+              <a:t>IPL </a:t>
+            </a:r>
+            <a:r>
+              <a:rPr lang="hu-HU" dirty="0" smtClean="0">
+                <a:sym typeface="Wingdings" panose="05000000000000000000" pitchFamily="2" charset="2"/>
+              </a:rPr>
+              <a:t> LISP </a:t>
             </a:r>
             <a:r>
               <a:rPr lang="hu-HU" dirty="0" smtClean="0"/>
@@ -4290,11 +4304,7 @@
             </a:r>
             <a:r>
               <a:rPr lang="hu-HU" dirty="0" smtClean="0"/>
-              <a:t> </a:t>
-            </a:r>
-            <a:r>
-              <a:rPr lang="hu-HU" dirty="0" smtClean="0"/>
-              <a:t>(</a:t>
+              <a:t> (</a:t>
             </a:r>
             <a:r>
               <a:rPr lang="hu-HU" dirty="0" err="1" smtClean="0"/>

</xml_diff>

<commit_message>
Added some more examples
</commit_message>
<xml_diff>
--- a/docs/FSharp.pptx
+++ b/docs/FSharp.pptx
@@ -3441,13 +3441,13 @@
               <a:rPr lang="hu-HU" dirty="0" smtClean="0"/>
               <a:t>, </a:t>
             </a:r>
-            <a:endParaRPr lang="hu-HU" dirty="0" smtClean="0"/>
-          </a:p>
-          <a:p>
-            <a:pPr lvl="1"/>
-            <a:r>
-              <a:rPr lang="hu-HU" dirty="0"/>
-              <a:t>Visual </a:t>
+            <a:r>
+              <a:rPr lang="hu-HU" dirty="0" err="1" smtClean="0"/>
+              <a:t>Visual</a:t>
+            </a:r>
+            <a:r>
+              <a:rPr lang="hu-HU" dirty="0" smtClean="0"/>
+              <a:t> </a:t>
             </a:r>
             <a:r>
               <a:rPr lang="hu-HU" dirty="0" err="1"/>
@@ -3486,7 +3486,7 @@
               <a:t> / </a:t>
             </a:r>
             <a:r>
-              <a:rPr lang="hu-HU" smtClean="0"/>
+              <a:rPr lang="hu-HU" dirty="0" err="1" smtClean="0"/>
               <a:t>MonoDevelop</a:t>
             </a:r>
             <a:endParaRPr lang="hu-HU" dirty="0"/>
@@ -3517,6 +3517,22 @@
               <a:rPr lang="hu-HU" dirty="0" smtClean="0"/>
               <a:t>…</a:t>
             </a:r>
+          </a:p>
+          <a:p>
+            <a:pPr lvl="1"/>
+            <a:r>
+              <a:rPr lang="hu-HU" dirty="0" err="1" smtClean="0"/>
+              <a:t>LINQPad</a:t>
+            </a:r>
+            <a:r>
+              <a:rPr lang="hu-HU" dirty="0" smtClean="0"/>
+              <a:t>, </a:t>
+            </a:r>
+            <a:r>
+              <a:rPr lang="hu-HU" dirty="0" err="1" smtClean="0"/>
+              <a:t>DotNetFiddle</a:t>
+            </a:r>
+            <a:endParaRPr lang="hu-HU" dirty="0" smtClean="0"/>
           </a:p>
           <a:p>
             <a:pPr marL="0" indent="0">

</xml_diff>

<commit_message>
Fixed typo in presentation
</commit_message>
<xml_diff>
--- a/docs/FSharp.pptx
+++ b/docs/FSharp.pptx
@@ -249,7 +249,7 @@
           <a:p>
             <a:fld id="{9A1D7074-13CB-487D-AFFF-07AA492B1B44}" type="datetimeFigureOut">
               <a:rPr lang="en-US" smtClean="0"/>
-              <a:t>9/3/2016</a:t>
+              <a:t>9/5/2016</a:t>
             </a:fld>
             <a:endParaRPr lang="en-US"/>
           </a:p>
@@ -419,7 +419,7 @@
           <a:p>
             <a:fld id="{9A1D7074-13CB-487D-AFFF-07AA492B1B44}" type="datetimeFigureOut">
               <a:rPr lang="en-US" smtClean="0"/>
-              <a:t>9/3/2016</a:t>
+              <a:t>9/5/2016</a:t>
             </a:fld>
             <a:endParaRPr lang="en-US"/>
           </a:p>
@@ -599,7 +599,7 @@
           <a:p>
             <a:fld id="{9A1D7074-13CB-487D-AFFF-07AA492B1B44}" type="datetimeFigureOut">
               <a:rPr lang="en-US" smtClean="0"/>
-              <a:t>9/3/2016</a:t>
+              <a:t>9/5/2016</a:t>
             </a:fld>
             <a:endParaRPr lang="en-US"/>
           </a:p>
@@ -769,7 +769,7 @@
           <a:p>
             <a:fld id="{9A1D7074-13CB-487D-AFFF-07AA492B1B44}" type="datetimeFigureOut">
               <a:rPr lang="en-US" smtClean="0"/>
-              <a:t>9/3/2016</a:t>
+              <a:t>9/5/2016</a:t>
             </a:fld>
             <a:endParaRPr lang="en-US"/>
           </a:p>
@@ -1015,7 +1015,7 @@
           <a:p>
             <a:fld id="{9A1D7074-13CB-487D-AFFF-07AA492B1B44}" type="datetimeFigureOut">
               <a:rPr lang="en-US" smtClean="0"/>
-              <a:t>9/3/2016</a:t>
+              <a:t>9/5/2016</a:t>
             </a:fld>
             <a:endParaRPr lang="en-US"/>
           </a:p>
@@ -1247,7 +1247,7 @@
           <a:p>
             <a:fld id="{9A1D7074-13CB-487D-AFFF-07AA492B1B44}" type="datetimeFigureOut">
               <a:rPr lang="en-US" smtClean="0"/>
-              <a:t>9/3/2016</a:t>
+              <a:t>9/5/2016</a:t>
             </a:fld>
             <a:endParaRPr lang="en-US"/>
           </a:p>
@@ -1614,7 +1614,7 @@
           <a:p>
             <a:fld id="{9A1D7074-13CB-487D-AFFF-07AA492B1B44}" type="datetimeFigureOut">
               <a:rPr lang="en-US" smtClean="0"/>
-              <a:t>9/3/2016</a:t>
+              <a:t>9/5/2016</a:t>
             </a:fld>
             <a:endParaRPr lang="en-US"/>
           </a:p>
@@ -1732,7 +1732,7 @@
           <a:p>
             <a:fld id="{9A1D7074-13CB-487D-AFFF-07AA492B1B44}" type="datetimeFigureOut">
               <a:rPr lang="en-US" smtClean="0"/>
-              <a:t>9/3/2016</a:t>
+              <a:t>9/5/2016</a:t>
             </a:fld>
             <a:endParaRPr lang="en-US"/>
           </a:p>
@@ -1827,7 +1827,7 @@
           <a:p>
             <a:fld id="{9A1D7074-13CB-487D-AFFF-07AA492B1B44}" type="datetimeFigureOut">
               <a:rPr lang="en-US" smtClean="0"/>
-              <a:t>9/3/2016</a:t>
+              <a:t>9/5/2016</a:t>
             </a:fld>
             <a:endParaRPr lang="en-US"/>
           </a:p>
@@ -2104,7 +2104,7 @@
           <a:p>
             <a:fld id="{9A1D7074-13CB-487D-AFFF-07AA492B1B44}" type="datetimeFigureOut">
               <a:rPr lang="en-US" smtClean="0"/>
-              <a:t>9/3/2016</a:t>
+              <a:t>9/5/2016</a:t>
             </a:fld>
             <a:endParaRPr lang="en-US"/>
           </a:p>
@@ -2357,7 +2357,7 @@
           <a:p>
             <a:fld id="{9A1D7074-13CB-487D-AFFF-07AA492B1B44}" type="datetimeFigureOut">
               <a:rPr lang="en-US" smtClean="0"/>
-              <a:t>9/3/2016</a:t>
+              <a:t>9/5/2016</a:t>
             </a:fld>
             <a:endParaRPr lang="en-US"/>
           </a:p>
@@ -2570,7 +2570,7 @@
           <a:p>
             <a:fld id="{9A1D7074-13CB-487D-AFFF-07AA492B1B44}" type="datetimeFigureOut">
               <a:rPr lang="en-US" smtClean="0"/>
-              <a:t>9/3/2016</a:t>
+              <a:t>9/5/2016</a:t>
             </a:fld>
             <a:endParaRPr lang="en-US"/>
           </a:p>
@@ -3111,16 +3111,8 @@
           <a:lstStyle/>
           <a:p>
             <a:r>
-              <a:rPr lang="hu-HU" dirty="0" err="1" smtClean="0"/>
-              <a:t>Functional</a:t>
-            </a:r>
-            <a:r>
-              <a:rPr lang="hu-HU" dirty="0" smtClean="0"/>
-              <a:t> </a:t>
-            </a:r>
-            <a:r>
-              <a:rPr lang="hu-HU" dirty="0" err="1" smtClean="0"/>
-              <a:t>first</a:t>
+              <a:rPr lang="hu-HU" smtClean="0"/>
+              <a:t>Functional-first</a:t>
             </a:r>
             <a:r>
               <a:rPr lang="hu-HU" dirty="0" smtClean="0"/>

</xml_diff>

<commit_message>
Some small prezentation updates
</commit_message>
<xml_diff>
--- a/docs/FSharp.pptx
+++ b/docs/FSharp.pptx
@@ -7,11 +7,10 @@
   <p:sldIdLst>
     <p:sldId id="256" r:id="rId2"/>
     <p:sldId id="265" r:id="rId3"/>
-    <p:sldId id="290" r:id="rId4"/>
-    <p:sldId id="268" r:id="rId5"/>
-    <p:sldId id="266" r:id="rId6"/>
-    <p:sldId id="277" r:id="rId7"/>
-    <p:sldId id="278" r:id="rId8"/>
+    <p:sldId id="268" r:id="rId4"/>
+    <p:sldId id="266" r:id="rId5"/>
+    <p:sldId id="277" r:id="rId6"/>
+    <p:sldId id="278" r:id="rId7"/>
   </p:sldIdLst>
   <p:sldSz cx="12192000" cy="6858000"/>
   <p:notesSz cx="6858000" cy="9144000"/>
@@ -249,7 +248,7 @@
           <a:p>
             <a:fld id="{9A1D7074-13CB-487D-AFFF-07AA492B1B44}" type="datetimeFigureOut">
               <a:rPr lang="en-US" smtClean="0"/>
-              <a:t>9/5/2016</a:t>
+              <a:t>9/24/2016</a:t>
             </a:fld>
             <a:endParaRPr lang="en-US"/>
           </a:p>
@@ -419,7 +418,7 @@
           <a:p>
             <a:fld id="{9A1D7074-13CB-487D-AFFF-07AA492B1B44}" type="datetimeFigureOut">
               <a:rPr lang="en-US" smtClean="0"/>
-              <a:t>9/5/2016</a:t>
+              <a:t>9/24/2016</a:t>
             </a:fld>
             <a:endParaRPr lang="en-US"/>
           </a:p>
@@ -599,7 +598,7 @@
           <a:p>
             <a:fld id="{9A1D7074-13CB-487D-AFFF-07AA492B1B44}" type="datetimeFigureOut">
               <a:rPr lang="en-US" smtClean="0"/>
-              <a:t>9/5/2016</a:t>
+              <a:t>9/24/2016</a:t>
             </a:fld>
             <a:endParaRPr lang="en-US"/>
           </a:p>
@@ -769,7 +768,7 @@
           <a:p>
             <a:fld id="{9A1D7074-13CB-487D-AFFF-07AA492B1B44}" type="datetimeFigureOut">
               <a:rPr lang="en-US" smtClean="0"/>
-              <a:t>9/5/2016</a:t>
+              <a:t>9/24/2016</a:t>
             </a:fld>
             <a:endParaRPr lang="en-US"/>
           </a:p>
@@ -1015,7 +1014,7 @@
           <a:p>
             <a:fld id="{9A1D7074-13CB-487D-AFFF-07AA492B1B44}" type="datetimeFigureOut">
               <a:rPr lang="en-US" smtClean="0"/>
-              <a:t>9/5/2016</a:t>
+              <a:t>9/24/2016</a:t>
             </a:fld>
             <a:endParaRPr lang="en-US"/>
           </a:p>
@@ -1247,7 +1246,7 @@
           <a:p>
             <a:fld id="{9A1D7074-13CB-487D-AFFF-07AA492B1B44}" type="datetimeFigureOut">
               <a:rPr lang="en-US" smtClean="0"/>
-              <a:t>9/5/2016</a:t>
+              <a:t>9/24/2016</a:t>
             </a:fld>
             <a:endParaRPr lang="en-US"/>
           </a:p>
@@ -1614,7 +1613,7 @@
           <a:p>
             <a:fld id="{9A1D7074-13CB-487D-AFFF-07AA492B1B44}" type="datetimeFigureOut">
               <a:rPr lang="en-US" smtClean="0"/>
-              <a:t>9/5/2016</a:t>
+              <a:t>9/24/2016</a:t>
             </a:fld>
             <a:endParaRPr lang="en-US"/>
           </a:p>
@@ -1732,7 +1731,7 @@
           <a:p>
             <a:fld id="{9A1D7074-13CB-487D-AFFF-07AA492B1B44}" type="datetimeFigureOut">
               <a:rPr lang="en-US" smtClean="0"/>
-              <a:t>9/5/2016</a:t>
+              <a:t>9/24/2016</a:t>
             </a:fld>
             <a:endParaRPr lang="en-US"/>
           </a:p>
@@ -1827,7 +1826,7 @@
           <a:p>
             <a:fld id="{9A1D7074-13CB-487D-AFFF-07AA492B1B44}" type="datetimeFigureOut">
               <a:rPr lang="en-US" smtClean="0"/>
-              <a:t>9/5/2016</a:t>
+              <a:t>9/24/2016</a:t>
             </a:fld>
             <a:endParaRPr lang="en-US"/>
           </a:p>
@@ -2104,7 +2103,7 @@
           <a:p>
             <a:fld id="{9A1D7074-13CB-487D-AFFF-07AA492B1B44}" type="datetimeFigureOut">
               <a:rPr lang="en-US" smtClean="0"/>
-              <a:t>9/5/2016</a:t>
+              <a:t>9/24/2016</a:t>
             </a:fld>
             <a:endParaRPr lang="en-US"/>
           </a:p>
@@ -2357,7 +2356,7 @@
           <a:p>
             <a:fld id="{9A1D7074-13CB-487D-AFFF-07AA492B1B44}" type="datetimeFigureOut">
               <a:rPr lang="en-US" smtClean="0"/>
-              <a:t>9/5/2016</a:t>
+              <a:t>9/24/2016</a:t>
             </a:fld>
             <a:endParaRPr lang="en-US"/>
           </a:p>
@@ -2570,7 +2569,7 @@
           <a:p>
             <a:fld id="{9A1D7074-13CB-487D-AFFF-07AA492B1B44}" type="datetimeFigureOut">
               <a:rPr lang="en-US" smtClean="0"/>
-              <a:t>9/5/2016</a:t>
+              <a:t>9/24/2016</a:t>
             </a:fld>
             <a:endParaRPr lang="en-US"/>
           </a:p>
@@ -2985,7 +2984,12 @@
             <p:ph type="ctrTitle"/>
           </p:nvPr>
         </p:nvSpPr>
-        <p:spPr/>
+        <p:spPr>
+          <a:xfrm>
+            <a:off x="1524000" y="1310621"/>
+            <a:ext cx="9144000" cy="2387600"/>
+          </a:xfrm>
+        </p:spPr>
         <p:txBody>
           <a:bodyPr/>
           <a:lstStyle/>
@@ -3016,14 +3020,49 @@
             <p:ph type="subTitle" idx="1"/>
           </p:nvPr>
         </p:nvSpPr>
-        <p:spPr/>
-        <p:txBody>
-          <a:bodyPr/>
-          <a:lstStyle/>
-          <a:p>
-            <a:r>
-              <a:rPr lang="hu-HU" dirty="0" smtClean="0"/>
-              <a:t>Róbert Fuszenecker, 2016</a:t>
+        <p:spPr>
+          <a:xfrm>
+            <a:off x="1524000" y="4072685"/>
+            <a:ext cx="9144000" cy="1655762"/>
+          </a:xfrm>
+        </p:spPr>
+        <p:txBody>
+          <a:bodyPr/>
+          <a:lstStyle/>
+          <a:p>
+            <a:r>
+              <a:rPr lang="hu-HU" dirty="0" smtClean="0"/>
+              <a:t>Róbert </a:t>
+            </a:r>
+            <a:r>
+              <a:rPr lang="hu-HU" dirty="0" smtClean="0"/>
+              <a:t>Fuszenecker</a:t>
+            </a:r>
+          </a:p>
+          <a:p>
+            <a:r>
+              <a:rPr lang="hu-HU" dirty="0" smtClean="0"/>
+              <a:t>29</a:t>
+            </a:r>
+            <a:r>
+              <a:rPr lang="hu-HU" baseline="30000" dirty="0" smtClean="0"/>
+              <a:t>th</a:t>
+            </a:r>
+            <a:r>
+              <a:rPr lang="hu-HU" dirty="0" smtClean="0"/>
+              <a:t> </a:t>
+            </a:r>
+            <a:r>
+              <a:rPr lang="hu-HU" dirty="0" err="1" smtClean="0"/>
+              <a:t>September</a:t>
+            </a:r>
+            <a:r>
+              <a:rPr lang="hu-HU" dirty="0" smtClean="0"/>
+              <a:t>, </a:t>
+            </a:r>
+            <a:r>
+              <a:rPr lang="hu-HU" dirty="0" smtClean="0"/>
+              <a:t>2016</a:t>
             </a:r>
             <a:endParaRPr lang="en-US" dirty="0"/>
           </a:p>
@@ -3111,7 +3150,7 @@
           <a:lstStyle/>
           <a:p>
             <a:r>
-              <a:rPr lang="hu-HU" smtClean="0"/>
+              <a:rPr lang="hu-HU" dirty="0" err="1" smtClean="0"/>
               <a:t>Functional-first</a:t>
             </a:r>
             <a:r>
@@ -3178,6 +3217,48 @@
           </a:p>
           <a:p>
             <a:r>
+              <a:rPr lang="hu-HU" dirty="0" err="1"/>
+              <a:t>Strongly</a:t>
+            </a:r>
+            <a:r>
+              <a:rPr lang="hu-HU" dirty="0"/>
+              <a:t> </a:t>
+            </a:r>
+            <a:r>
+              <a:rPr lang="hu-HU" dirty="0" err="1"/>
+              <a:t>typed</a:t>
+            </a:r>
+            <a:r>
+              <a:rPr lang="hu-HU" dirty="0"/>
+              <a:t> </a:t>
+            </a:r>
+            <a:r>
+              <a:rPr lang="hu-HU" dirty="0" err="1"/>
+              <a:t>with</a:t>
+            </a:r>
+            <a:r>
+              <a:rPr lang="hu-HU" dirty="0"/>
+              <a:t> </a:t>
+            </a:r>
+            <a:r>
+              <a:rPr lang="hu-HU" dirty="0" err="1"/>
+              <a:t>type</a:t>
+            </a:r>
+            <a:r>
+              <a:rPr lang="hu-HU" dirty="0"/>
+              <a:t> </a:t>
+            </a:r>
+            <a:r>
+              <a:rPr lang="hu-HU" dirty="0" err="1"/>
+              <a:t>inference</a:t>
+            </a:r>
+            <a:endParaRPr lang="hu-HU" dirty="0"/>
+          </a:p>
+          <a:p>
+            <a:endParaRPr lang="hu-HU" dirty="0"/>
+          </a:p>
+          <a:p>
+            <a:r>
               <a:rPr lang="hu-HU" dirty="0" err="1" smtClean="0"/>
               <a:t>Full</a:t>
             </a:r>
@@ -3237,40 +3318,35 @@
           <a:p>
             <a:r>
               <a:rPr lang="hu-HU" dirty="0" err="1" smtClean="0"/>
-              <a:t>Strongly</a:t>
-            </a:r>
-            <a:r>
-              <a:rPr lang="hu-HU" dirty="0" smtClean="0"/>
-              <a:t> </a:t>
-            </a:r>
-            <a:r>
-              <a:rPr lang="hu-HU" dirty="0" err="1" smtClean="0"/>
-              <a:t>typed</a:t>
+              <a:t>Open-sourced</a:t>
+            </a:r>
+            <a:r>
+              <a:rPr lang="hu-HU" dirty="0" smtClean="0"/>
+              <a:t> </a:t>
             </a:r>
             <a:r>
               <a:rPr lang="hu-HU" dirty="0"/>
-              <a:t> </a:t>
-            </a:r>
-            <a:r>
-              <a:rPr lang="hu-HU" dirty="0" err="1" smtClean="0"/>
-              <a:t>with</a:t>
-            </a:r>
-            <a:r>
-              <a:rPr lang="hu-HU" dirty="0" smtClean="0"/>
-              <a:t> </a:t>
-            </a:r>
-            <a:r>
-              <a:rPr lang="hu-HU" dirty="0" err="1" smtClean="0"/>
-              <a:t>type</a:t>
-            </a:r>
-            <a:r>
-              <a:rPr lang="hu-HU" dirty="0" smtClean="0"/>
-              <a:t> </a:t>
-            </a:r>
-            <a:r>
-              <a:rPr lang="hu-HU" dirty="0" err="1" smtClean="0"/>
-              <a:t>inference</a:t>
-            </a:r>
+              <a:t>ab ovo: </a:t>
+            </a:r>
+            <a:r>
+              <a:rPr lang="hu-HU" dirty="0" err="1"/>
+              <a:t>Microsoft’s</a:t>
+            </a:r>
+            <a:r>
+              <a:rPr lang="hu-HU" dirty="0"/>
+              <a:t> </a:t>
+            </a:r>
+            <a:r>
+              <a:rPr lang="hu-HU" dirty="0" err="1"/>
+              <a:t>first</a:t>
+            </a:r>
+            <a:r>
+              <a:rPr lang="hu-HU" dirty="0"/>
+              <a:t> OSS project</a:t>
+            </a:r>
+            <a:endParaRPr lang="en-US" dirty="0"/>
+          </a:p>
+          <a:p>
             <a:endParaRPr lang="hu-HU" dirty="0" smtClean="0"/>
           </a:p>
         </p:txBody>
@@ -3329,11 +3405,7 @@
           <a:p>
             <a:r>
               <a:rPr lang="hu-HU" dirty="0" err="1" smtClean="0"/>
-              <a:t>About</a:t>
-            </a:r>
-            <a:r>
-              <a:rPr lang="hu-HU" dirty="0" smtClean="0"/>
-              <a:t> F# 2</a:t>
+              <a:t>History</a:t>
             </a:r>
             <a:endParaRPr lang="en-US" dirty="0"/>
           </a:p>
@@ -3358,7 +3430,157 @@
           <a:p>
             <a:r>
               <a:rPr lang="hu-HU" dirty="0" err="1" smtClean="0"/>
-              <a:t>For</a:t>
+              <a:t>From</a:t>
+            </a:r>
+            <a:r>
+              <a:rPr lang="hu-HU" dirty="0" smtClean="0"/>
+              <a:t> </a:t>
+            </a:r>
+            <a:r>
+              <a:rPr lang="hu-HU" dirty="0" err="1" smtClean="0"/>
+              <a:t>engineering</a:t>
+            </a:r>
+            <a:r>
+              <a:rPr lang="hu-HU" dirty="0" smtClean="0"/>
+              <a:t> </a:t>
+            </a:r>
+            <a:r>
+              <a:rPr lang="hu-HU" dirty="0" err="1" smtClean="0"/>
+              <a:t>side</a:t>
+            </a:r>
+            <a:r>
+              <a:rPr lang="hu-HU" dirty="0" smtClean="0"/>
+              <a:t> (</a:t>
+            </a:r>
+            <a:r>
+              <a:rPr lang="hu-HU" dirty="0" err="1" smtClean="0"/>
+              <a:t>Turing-machine</a:t>
+            </a:r>
+            <a:r>
+              <a:rPr lang="hu-HU" dirty="0" smtClean="0"/>
+              <a:t>)</a:t>
+            </a:r>
+          </a:p>
+          <a:p>
+            <a:endParaRPr lang="hu-HU" dirty="0"/>
+          </a:p>
+          <a:p>
+            <a:pPr marL="0" indent="0">
+              <a:buNone/>
+            </a:pPr>
+            <a:r>
+              <a:rPr lang="hu-HU" dirty="0" smtClean="0"/>
+              <a:t>	</a:t>
+            </a:r>
+            <a:r>
+              <a:rPr lang="hu-HU" dirty="0" err="1" smtClean="0"/>
+              <a:t>Machine</a:t>
+            </a:r>
+            <a:r>
+              <a:rPr lang="hu-HU" dirty="0" smtClean="0"/>
+              <a:t> </a:t>
+            </a:r>
+            <a:r>
+              <a:rPr lang="hu-HU" dirty="0" err="1" smtClean="0"/>
+              <a:t>Code</a:t>
+            </a:r>
+            <a:r>
+              <a:rPr lang="hu-HU" dirty="0" smtClean="0"/>
+              <a:t> </a:t>
+            </a:r>
+            <a:r>
+              <a:rPr lang="hu-HU" dirty="0" smtClean="0">
+                <a:sym typeface="Wingdings" panose="05000000000000000000" pitchFamily="2" charset="2"/>
+              </a:rPr>
+              <a:t> Assembly  C  </a:t>
+            </a:r>
+            <a:r>
+              <a:rPr lang="hu-HU" dirty="0" err="1" smtClean="0">
+                <a:sym typeface="Wingdings" panose="05000000000000000000" pitchFamily="2" charset="2"/>
+              </a:rPr>
+              <a:t>C</a:t>
+            </a:r>
+            <a:r>
+              <a:rPr lang="hu-HU" dirty="0" smtClean="0">
+                <a:sym typeface="Wingdings" panose="05000000000000000000" pitchFamily="2" charset="2"/>
+              </a:rPr>
+              <a:t>++  Java  C</a:t>
+            </a:r>
+            <a:r>
+              <a:rPr lang="hu-HU" dirty="0" smtClean="0">
+                <a:sym typeface="Wingdings" panose="05000000000000000000" pitchFamily="2" charset="2"/>
+              </a:rPr>
+              <a:t>#</a:t>
+            </a:r>
+          </a:p>
+          <a:p>
+            <a:pPr marL="0" indent="0">
+              <a:buNone/>
+            </a:pPr>
+            <a:r>
+              <a:rPr lang="hu-HU" sz="1400" dirty="0">
+                <a:sym typeface="Wingdings" panose="05000000000000000000" pitchFamily="2" charset="2"/>
+              </a:rPr>
+              <a:t> </a:t>
+            </a:r>
+            <a:r>
+              <a:rPr lang="hu-HU" sz="1400" dirty="0" smtClean="0">
+                <a:sym typeface="Wingdings" panose="05000000000000000000" pitchFamily="2" charset="2"/>
+              </a:rPr>
+              <a:t>                                                                                                                                       1972        1983                  1995                   2000</a:t>
+            </a:r>
+            <a:endParaRPr lang="hu-HU" sz="1400" dirty="0" smtClean="0">
+              <a:sym typeface="Wingdings" panose="05000000000000000000" pitchFamily="2" charset="2"/>
+            </a:endParaRPr>
+          </a:p>
+          <a:p>
+            <a:pPr marL="0" indent="0">
+              <a:buNone/>
+            </a:pPr>
+            <a:endParaRPr lang="hu-HU" dirty="0">
+              <a:sym typeface="Wingdings" panose="05000000000000000000" pitchFamily="2" charset="2"/>
+            </a:endParaRPr>
+          </a:p>
+          <a:p>
+            <a:r>
+              <a:rPr lang="hu-HU" dirty="0" err="1" smtClean="0"/>
+              <a:t>From</a:t>
+            </a:r>
+            <a:r>
+              <a:rPr lang="hu-HU" dirty="0" smtClean="0"/>
+              <a:t> </a:t>
+            </a:r>
+            <a:r>
+              <a:rPr lang="hu-HU" dirty="0" err="1" smtClean="0"/>
+              <a:t>scientific</a:t>
+            </a:r>
+            <a:r>
+              <a:rPr lang="hu-HU" dirty="0" smtClean="0"/>
+              <a:t> </a:t>
+            </a:r>
+            <a:r>
+              <a:rPr lang="hu-HU" dirty="0" err="1" smtClean="0"/>
+              <a:t>side</a:t>
+            </a:r>
+            <a:r>
+              <a:rPr lang="hu-HU" dirty="0" smtClean="0"/>
+              <a:t> (</a:t>
+            </a:r>
+            <a:r>
+              <a:rPr lang="el-GR" dirty="0"/>
+              <a:t>λ</a:t>
+            </a:r>
+            <a:r>
+              <a:rPr lang="hu-HU" dirty="0" err="1" smtClean="0"/>
+              <a:t>-calculus</a:t>
+            </a:r>
+            <a:r>
+              <a:rPr lang="hu-HU" dirty="0" smtClean="0"/>
+              <a:t>, </a:t>
+            </a:r>
+            <a:r>
+              <a:rPr lang="hu-HU" dirty="0" err="1" smtClean="0"/>
+              <a:t>Alonzo</a:t>
             </a:r>
             <a:r>
               <a:rPr lang="hu-HU" dirty="0" smtClean="0"/>
@@ -3366,215 +3588,147 @@
             </a:r>
             <a:r>
               <a:rPr lang="hu-HU" dirty="0" err="1"/>
-              <a:t>application</a:t>
+              <a:t>Church</a:t>
             </a:r>
             <a:r>
               <a:rPr lang="hu-HU" dirty="0"/>
-              <a:t> </a:t>
-            </a:r>
-            <a:r>
-              <a:rPr lang="hu-HU" dirty="0" err="1"/>
-              <a:t>development</a:t>
-            </a:r>
-            <a:r>
-              <a:rPr lang="hu-HU" dirty="0"/>
-              <a:t> and scripting (</a:t>
-            </a:r>
-            <a:r>
-              <a:rPr lang="hu-HU" dirty="0" err="1" smtClean="0"/>
-              <a:t>tools</a:t>
-            </a:r>
-            <a:r>
-              <a:rPr lang="hu-HU" dirty="0" smtClean="0"/>
-              <a:t>)</a:t>
-            </a:r>
+              <a:t>, 1930s)</a:t>
+            </a:r>
+            <a:endParaRPr lang="hu-HU" dirty="0" smtClean="0"/>
+          </a:p>
+          <a:p>
             <a:endParaRPr lang="hu-HU" dirty="0"/>
           </a:p>
           <a:p>
-            <a:pPr marL="457200" lvl="1" indent="0">
+            <a:pPr marL="0" indent="0">
               <a:buNone/>
             </a:pPr>
-            <a:endParaRPr lang="hu-HU" dirty="0"/>
-          </a:p>
-          <a:p>
-            <a:r>
-              <a:rPr lang="hu-HU" dirty="0"/>
-              <a:t>Support </a:t>
-            </a:r>
-            <a:r>
-              <a:rPr lang="hu-HU" dirty="0" err="1"/>
-              <a:t>exists</a:t>
-            </a:r>
-            <a:r>
-              <a:rPr lang="hu-HU" dirty="0"/>
-              <a:t> </a:t>
-            </a:r>
-            <a:r>
-              <a:rPr lang="hu-HU" dirty="0" err="1"/>
-              <a:t>for</a:t>
-            </a:r>
-            <a:r>
-              <a:rPr lang="hu-HU" dirty="0"/>
-              <a:t> </a:t>
-            </a:r>
-            <a:endParaRPr lang="hu-HU" dirty="0" smtClean="0"/>
-          </a:p>
-          <a:p>
-            <a:pPr lvl="1"/>
-            <a:r>
-              <a:rPr lang="hu-HU" dirty="0" smtClean="0"/>
-              <a:t>Visual </a:t>
-            </a:r>
-            <a:r>
-              <a:rPr lang="hu-HU" dirty="0" err="1" smtClean="0"/>
-              <a:t>Studio</a:t>
-            </a:r>
-            <a:r>
-              <a:rPr lang="hu-HU" dirty="0" smtClean="0"/>
-              <a:t>, </a:t>
-            </a:r>
-            <a:r>
-              <a:rPr lang="hu-HU" dirty="0" err="1" smtClean="0"/>
-              <a:t>Visual</a:t>
-            </a:r>
-            <a:r>
-              <a:rPr lang="hu-HU" dirty="0" smtClean="0"/>
-              <a:t> </a:t>
-            </a:r>
-            <a:r>
-              <a:rPr lang="hu-HU" dirty="0" err="1"/>
-              <a:t>Studio</a:t>
-            </a:r>
-            <a:r>
-              <a:rPr lang="hu-HU" dirty="0"/>
-              <a:t> </a:t>
-            </a:r>
-            <a:r>
-              <a:rPr lang="hu-HU" dirty="0" err="1"/>
-              <a:t>Code</a:t>
-            </a:r>
-            <a:r>
-              <a:rPr lang="hu-HU" dirty="0"/>
-              <a:t>, </a:t>
-            </a:r>
-            <a:endParaRPr lang="hu-HU" dirty="0" smtClean="0"/>
-          </a:p>
-          <a:p>
-            <a:pPr lvl="1"/>
-            <a:r>
-              <a:rPr lang="hu-HU" dirty="0" err="1" smtClean="0"/>
-              <a:t>Xamarin</a:t>
-            </a:r>
-            <a:r>
-              <a:rPr lang="hu-HU" dirty="0" smtClean="0"/>
-              <a:t> </a:t>
-            </a:r>
-            <a:r>
-              <a:rPr lang="hu-HU" dirty="0" err="1" smtClean="0"/>
-              <a:t>Studio</a:t>
-            </a:r>
-            <a:r>
-              <a:rPr lang="hu-HU" dirty="0" smtClean="0"/>
-              <a:t> / </a:t>
-            </a:r>
-            <a:r>
-              <a:rPr lang="hu-HU" dirty="0" err="1" smtClean="0"/>
-              <a:t>MonoDevelop</a:t>
-            </a:r>
-            <a:endParaRPr lang="hu-HU" dirty="0"/>
-          </a:p>
-          <a:p>
-            <a:pPr lvl="1"/>
-            <a:r>
-              <a:rPr lang="hu-HU" dirty="0" smtClean="0"/>
-              <a:t>Atom</a:t>
-            </a:r>
-            <a:r>
-              <a:rPr lang="hu-HU" dirty="0"/>
-              <a:t>, </a:t>
-            </a:r>
-            <a:r>
-              <a:rPr lang="hu-HU" dirty="0" err="1" smtClean="0"/>
-              <a:t>vim</a:t>
-            </a:r>
-            <a:r>
-              <a:rPr lang="hu-HU" dirty="0" smtClean="0"/>
-              <a:t>, </a:t>
-            </a:r>
-            <a:r>
-              <a:rPr lang="hu-HU" dirty="0" err="1" smtClean="0"/>
-              <a:t>emacs</a:t>
-            </a:r>
-            <a:r>
-              <a:rPr lang="hu-HU" dirty="0" smtClean="0"/>
-              <a:t>…</a:t>
-            </a:r>
-          </a:p>
-          <a:p>
-            <a:pPr lvl="1"/>
-            <a:r>
-              <a:rPr lang="hu-HU" dirty="0" err="1" smtClean="0"/>
-              <a:t>LINQPad</a:t>
-            </a:r>
-            <a:r>
-              <a:rPr lang="hu-HU" dirty="0" smtClean="0"/>
-              <a:t>, </a:t>
-            </a:r>
-            <a:r>
-              <a:rPr lang="hu-HU" dirty="0" err="1" smtClean="0"/>
-              <a:t>DotNetFiddle</a:t>
-            </a:r>
-            <a:endParaRPr lang="hu-HU" dirty="0" smtClean="0"/>
+            <a:r>
+              <a:rPr lang="hu-HU" dirty="0" smtClean="0"/>
+              <a:t>	</a:t>
+            </a:r>
+            <a:r>
+              <a:rPr lang="hu-HU" dirty="0" smtClean="0">
+                <a:solidFill>
+                  <a:schemeClr val="bg1">
+                    <a:lumMod val="75000"/>
+                  </a:schemeClr>
+                </a:solidFill>
+                <a:sym typeface="Wingdings" panose="05000000000000000000" pitchFamily="2" charset="2"/>
+              </a:rPr>
+              <a:t>IPL  </a:t>
+            </a:r>
+            <a:r>
+              <a:rPr lang="hu-HU" dirty="0" smtClean="0">
+                <a:solidFill>
+                  <a:schemeClr val="bg1">
+                    <a:lumMod val="75000"/>
+                  </a:schemeClr>
+                </a:solidFill>
+                <a:sym typeface="Wingdings" panose="05000000000000000000" pitchFamily="2" charset="2"/>
+              </a:rPr>
+              <a:t>ISWIM  (LISP )</a:t>
+            </a:r>
+            <a:r>
+              <a:rPr lang="hu-HU" dirty="0" smtClean="0"/>
+              <a:t> </a:t>
+            </a:r>
+            <a:r>
+              <a:rPr lang="hu-HU" dirty="0" smtClean="0"/>
+              <a:t>ML </a:t>
+            </a:r>
+            <a:r>
+              <a:rPr lang="hu-HU" dirty="0" smtClean="0">
+                <a:sym typeface="Wingdings" panose="05000000000000000000" pitchFamily="2" charset="2"/>
+              </a:rPr>
+              <a:t> SML  </a:t>
+            </a:r>
+            <a:r>
+              <a:rPr lang="hu-HU" dirty="0" err="1" smtClean="0">
+                <a:sym typeface="Wingdings" panose="05000000000000000000" pitchFamily="2" charset="2"/>
+              </a:rPr>
+              <a:t>Caml</a:t>
+            </a:r>
+            <a:r>
+              <a:rPr lang="hu-HU" dirty="0" smtClean="0">
+                <a:sym typeface="Wingdings" panose="05000000000000000000" pitchFamily="2" charset="2"/>
+              </a:rPr>
+              <a:t>  </a:t>
+            </a:r>
+            <a:r>
+              <a:rPr lang="hu-HU" dirty="0" err="1" smtClean="0">
+                <a:sym typeface="Wingdings" panose="05000000000000000000" pitchFamily="2" charset="2"/>
+              </a:rPr>
+              <a:t>OCaml</a:t>
+            </a:r>
+            <a:r>
+              <a:rPr lang="hu-HU" dirty="0" smtClean="0">
+                <a:sym typeface="Wingdings" panose="05000000000000000000" pitchFamily="2" charset="2"/>
+              </a:rPr>
+              <a:t>  F</a:t>
+            </a:r>
+            <a:r>
+              <a:rPr lang="hu-HU" dirty="0" smtClean="0">
+                <a:sym typeface="Wingdings" panose="05000000000000000000" pitchFamily="2" charset="2"/>
+              </a:rPr>
+              <a:t>#</a:t>
+            </a:r>
+            <a:endParaRPr lang="hu-HU" dirty="0">
+              <a:sym typeface="Wingdings" panose="05000000000000000000" pitchFamily="2" charset="2"/>
+            </a:endParaRPr>
           </a:p>
           <a:p>
             <a:pPr marL="0" indent="0">
               <a:buNone/>
             </a:pPr>
-            <a:endParaRPr lang="hu-HU" dirty="0"/>
-          </a:p>
-          <a:p>
-            <a:r>
-              <a:rPr lang="hu-HU" dirty="0" err="1"/>
-              <a:t>Open-sourced</a:t>
-            </a:r>
-            <a:r>
-              <a:rPr lang="hu-HU" dirty="0"/>
-              <a:t> ab ovo: </a:t>
-            </a:r>
-            <a:r>
-              <a:rPr lang="hu-HU" dirty="0" err="1"/>
-              <a:t>Microsoft’s</a:t>
-            </a:r>
-            <a:r>
-              <a:rPr lang="hu-HU" dirty="0"/>
-              <a:t> </a:t>
-            </a:r>
-            <a:r>
-              <a:rPr lang="hu-HU" dirty="0" err="1"/>
-              <a:t>first</a:t>
-            </a:r>
-            <a:r>
-              <a:rPr lang="hu-HU" dirty="0"/>
-              <a:t> </a:t>
-            </a:r>
-            <a:r>
-              <a:rPr lang="hu-HU" dirty="0" smtClean="0"/>
-              <a:t>OSS project</a:t>
-            </a:r>
-            <a:endParaRPr lang="en-US" dirty="0"/>
+            <a:r>
+              <a:rPr lang="hu-HU" sz="1400" dirty="0">
+                <a:solidFill>
+                  <a:schemeClr val="bg1">
+                    <a:lumMod val="75000"/>
+                  </a:schemeClr>
+                </a:solidFill>
+                <a:sym typeface="Wingdings" panose="05000000000000000000" pitchFamily="2" charset="2"/>
+              </a:rPr>
+              <a:t> </a:t>
+            </a:r>
+            <a:r>
+              <a:rPr lang="hu-HU" sz="1400" dirty="0" smtClean="0">
+                <a:solidFill>
+                  <a:schemeClr val="bg1">
+                    <a:lumMod val="75000"/>
+                  </a:schemeClr>
+                </a:solidFill>
+                <a:sym typeface="Wingdings" panose="05000000000000000000" pitchFamily="2" charset="2"/>
+              </a:rPr>
+              <a:t>                      1956              1966                             1958                        </a:t>
+            </a:r>
+            <a:r>
+              <a:rPr lang="hu-HU" sz="1400" dirty="0" smtClean="0">
+                <a:sym typeface="Wingdings" panose="05000000000000000000" pitchFamily="2" charset="2"/>
+              </a:rPr>
+              <a:t>1973               (1990)                 1985                      1996                           2005</a:t>
+            </a:r>
           </a:p>
         </p:txBody>
       </p:sp>
     </p:spTree>
     <p:extLst>
       <p:ext uri="{BB962C8B-B14F-4D97-AF65-F5344CB8AC3E}">
-        <p14:creationId xmlns:p14="http://schemas.microsoft.com/office/powerpoint/2010/main" val="1889635201"/>
+        <p14:creationId xmlns:p14="http://schemas.microsoft.com/office/powerpoint/2010/main" val="1122456483"/>
       </p:ext>
     </p:extLst>
   </p:cSld>
   <p:clrMapOvr>
     <a:masterClrMapping/>
   </p:clrMapOvr>
+  <p:timing>
+    <p:tnLst>
+      <p:par>
+        <p:cTn id="1" dur="indefinite" restart="never" nodeType="tmRoot"/>
+      </p:par>
+    </p:tnLst>
+  </p:timing>
 </p:sld>
 </file>
 
@@ -3612,7 +3766,15 @@
           <a:p>
             <a:r>
               <a:rPr lang="hu-HU" dirty="0" err="1" smtClean="0"/>
-              <a:t>History</a:t>
+              <a:t>Functional</a:t>
+            </a:r>
+            <a:r>
+              <a:rPr lang="hu-HU" dirty="0" smtClean="0"/>
+              <a:t> </a:t>
+            </a:r>
+            <a:r>
+              <a:rPr lang="hu-HU" dirty="0" err="1" smtClean="0"/>
+              <a:t>programming</a:t>
             </a:r>
             <a:endParaRPr lang="en-US" dirty="0"/>
           </a:p>
@@ -3637,15 +3799,205 @@
           <a:p>
             <a:r>
               <a:rPr lang="hu-HU" dirty="0" err="1" smtClean="0"/>
-              <a:t>From</a:t>
-            </a:r>
-            <a:r>
-              <a:rPr lang="hu-HU" dirty="0" smtClean="0"/>
-              <a:t> </a:t>
-            </a:r>
-            <a:r>
-              <a:rPr lang="hu-HU" dirty="0" err="1" smtClean="0"/>
-              <a:t>engineering</a:t>
+              <a:t>Functions</a:t>
+            </a:r>
+            <a:r>
+              <a:rPr lang="hu-HU" dirty="0" smtClean="0"/>
+              <a:t> </a:t>
+            </a:r>
+            <a:r>
+              <a:rPr lang="hu-HU" dirty="0" err="1" smtClean="0"/>
+              <a:t>are</a:t>
+            </a:r>
+            <a:r>
+              <a:rPr lang="hu-HU" dirty="0" smtClean="0"/>
+              <a:t> </a:t>
+            </a:r>
+            <a:r>
+              <a:rPr lang="hu-HU" dirty="0" err="1" smtClean="0"/>
+              <a:t>first-class</a:t>
+            </a:r>
+            <a:r>
+              <a:rPr lang="hu-HU" dirty="0" smtClean="0"/>
+              <a:t> </a:t>
+            </a:r>
+            <a:r>
+              <a:rPr lang="hu-HU" dirty="0" err="1" smtClean="0"/>
+              <a:t>citizens</a:t>
+            </a:r>
+            <a:endParaRPr lang="hu-HU" dirty="0" smtClean="0"/>
+          </a:p>
+          <a:p>
+            <a:r>
+              <a:rPr lang="hu-HU" dirty="0"/>
+              <a:t>Data is </a:t>
+            </a:r>
+            <a:r>
+              <a:rPr lang="hu-HU" dirty="0" err="1"/>
+              <a:t>immutable</a:t>
+            </a:r>
+            <a:r>
+              <a:rPr lang="hu-HU" dirty="0"/>
+              <a:t> </a:t>
+            </a:r>
+            <a:r>
+              <a:rPr lang="hu-HU" dirty="0" err="1"/>
+              <a:t>by</a:t>
+            </a:r>
+            <a:r>
+              <a:rPr lang="hu-HU" dirty="0"/>
+              <a:t> </a:t>
+            </a:r>
+            <a:r>
+              <a:rPr lang="hu-HU" dirty="0" err="1"/>
+              <a:t>default</a:t>
+            </a:r>
+            <a:endParaRPr lang="hu-HU" dirty="0"/>
+          </a:p>
+          <a:p>
+            <a:r>
+              <a:rPr lang="hu-HU" dirty="0" smtClean="0"/>
+              <a:t>The </a:t>
+            </a:r>
+            <a:r>
+              <a:rPr lang="hu-HU" dirty="0" err="1" smtClean="0"/>
+              <a:t>application</a:t>
+            </a:r>
+            <a:r>
+              <a:rPr lang="hu-HU" dirty="0" smtClean="0"/>
+              <a:t> </a:t>
+            </a:r>
+            <a:r>
+              <a:rPr lang="hu-HU" dirty="0" err="1" smtClean="0"/>
+              <a:t>evaluates</a:t>
+            </a:r>
+            <a:r>
+              <a:rPr lang="hu-HU" dirty="0" smtClean="0"/>
+              <a:t> </a:t>
+            </a:r>
+            <a:r>
+              <a:rPr lang="hu-HU" dirty="0" err="1" smtClean="0"/>
+              <a:t>expressions</a:t>
+            </a:r>
+            <a:r>
+              <a:rPr lang="hu-HU" dirty="0" smtClean="0"/>
+              <a:t>, </a:t>
+            </a:r>
+            <a:r>
+              <a:rPr lang="hu-HU" dirty="0" err="1" smtClean="0"/>
+              <a:t>functions</a:t>
+            </a:r>
+            <a:r>
+              <a:rPr lang="hu-HU" dirty="0" smtClean="0"/>
+              <a:t> and </a:t>
+            </a:r>
+            <a:r>
+              <a:rPr lang="hu-HU" dirty="0" err="1" smtClean="0"/>
+              <a:t>returns</a:t>
+            </a:r>
+            <a:r>
+              <a:rPr lang="hu-HU" dirty="0" smtClean="0"/>
+              <a:t> </a:t>
+            </a:r>
+            <a:r>
+              <a:rPr lang="hu-HU" dirty="0" err="1" smtClean="0"/>
+              <a:t>the</a:t>
+            </a:r>
+            <a:r>
+              <a:rPr lang="hu-HU" dirty="0" smtClean="0"/>
+              <a:t> </a:t>
+            </a:r>
+            <a:r>
+              <a:rPr lang="hu-HU" dirty="0" err="1" smtClean="0"/>
+              <a:t>result</a:t>
+            </a:r>
+            <a:endParaRPr lang="hu-HU" dirty="0" smtClean="0"/>
+          </a:p>
+          <a:p>
+            <a:pPr lvl="1"/>
+            <a:r>
+              <a:rPr lang="hu-HU" dirty="0" err="1" smtClean="0"/>
+              <a:t>Transforms</a:t>
+            </a:r>
+            <a:r>
+              <a:rPr lang="hu-HU" dirty="0" smtClean="0"/>
+              <a:t> </a:t>
+            </a:r>
+            <a:r>
+              <a:rPr lang="hu-HU" dirty="0" err="1" smtClean="0"/>
+              <a:t>the</a:t>
+            </a:r>
+            <a:r>
+              <a:rPr lang="hu-HU" dirty="0" smtClean="0"/>
+              <a:t> </a:t>
+            </a:r>
+            <a:r>
+              <a:rPr lang="hu-HU" dirty="0" err="1" smtClean="0"/>
+              <a:t>immutable</a:t>
+            </a:r>
+            <a:r>
+              <a:rPr lang="hu-HU" dirty="0" smtClean="0"/>
+              <a:t> </a:t>
+            </a:r>
+            <a:r>
+              <a:rPr lang="hu-HU" dirty="0" err="1" smtClean="0"/>
+              <a:t>state</a:t>
+            </a:r>
+            <a:r>
+              <a:rPr lang="hu-HU" dirty="0" smtClean="0"/>
+              <a:t> </a:t>
+            </a:r>
+            <a:r>
+              <a:rPr lang="hu-HU" dirty="0" err="1" smtClean="0"/>
+              <a:t>to</a:t>
+            </a:r>
+            <a:r>
+              <a:rPr lang="hu-HU" dirty="0" smtClean="0"/>
+              <a:t> a </a:t>
+            </a:r>
+            <a:r>
+              <a:rPr lang="hu-HU" dirty="0" err="1" smtClean="0"/>
+              <a:t>new</a:t>
+            </a:r>
+            <a:r>
+              <a:rPr lang="hu-HU" dirty="0" smtClean="0"/>
+              <a:t> </a:t>
+            </a:r>
+            <a:r>
+              <a:rPr lang="hu-HU" dirty="0" err="1" smtClean="0"/>
+              <a:t>state</a:t>
+            </a:r>
+            <a:endParaRPr lang="hu-HU" dirty="0" smtClean="0"/>
+          </a:p>
+          <a:p>
+            <a:pPr lvl="1"/>
+            <a:r>
+              <a:rPr lang="hu-HU" dirty="0" err="1" smtClean="0"/>
+              <a:t>Functions</a:t>
+            </a:r>
+            <a:r>
+              <a:rPr lang="hu-HU" dirty="0" smtClean="0"/>
+              <a:t> </a:t>
+            </a:r>
+            <a:r>
+              <a:rPr lang="hu-HU" dirty="0" err="1" smtClean="0"/>
+              <a:t>don’t</a:t>
+            </a:r>
+            <a:r>
+              <a:rPr lang="hu-HU" dirty="0" smtClean="0"/>
+              <a:t> </a:t>
+            </a:r>
+            <a:r>
+              <a:rPr lang="hu-HU" dirty="0" err="1" smtClean="0"/>
+              <a:t>have</a:t>
+            </a:r>
+            <a:r>
+              <a:rPr lang="hu-HU" dirty="0" smtClean="0"/>
+              <a:t> </a:t>
+            </a:r>
+            <a:r>
+              <a:rPr lang="hu-HU" dirty="0" err="1" smtClean="0"/>
+              <a:t>any</a:t>
             </a:r>
             <a:r>
               <a:rPr lang="hu-HU" dirty="0" smtClean="0"/>
@@ -3657,190 +4009,167 @@
             </a:r>
             <a:r>
               <a:rPr lang="hu-HU" dirty="0" smtClean="0"/>
-              <a:t> (</a:t>
-            </a:r>
-            <a:r>
-              <a:rPr lang="hu-HU" dirty="0" err="1" smtClean="0"/>
-              <a:t>Turing-machine</a:t>
-            </a:r>
-            <a:r>
-              <a:rPr lang="hu-HU" dirty="0" smtClean="0"/>
-              <a:t>)</a:t>
-            </a:r>
+              <a:t> </a:t>
+            </a:r>
+            <a:r>
+              <a:rPr lang="hu-HU" dirty="0" err="1" smtClean="0"/>
+              <a:t>effects</a:t>
+            </a:r>
+            <a:endParaRPr lang="hu-HU" dirty="0" smtClean="0"/>
+          </a:p>
+          <a:p>
+            <a:r>
+              <a:rPr lang="hu-HU" dirty="0" err="1" smtClean="0"/>
+              <a:t>Information</a:t>
+            </a:r>
+            <a:r>
+              <a:rPr lang="hu-HU" dirty="0" smtClean="0"/>
+              <a:t> </a:t>
+            </a:r>
+            <a:r>
+              <a:rPr lang="hu-HU" dirty="0" err="1" smtClean="0"/>
+              <a:t>can</a:t>
+            </a:r>
+            <a:r>
+              <a:rPr lang="hu-HU" dirty="0" smtClean="0"/>
+              <a:t> </a:t>
+            </a:r>
+            <a:r>
+              <a:rPr lang="hu-HU" dirty="0" err="1" smtClean="0"/>
+              <a:t>come</a:t>
+            </a:r>
+            <a:r>
+              <a:rPr lang="hu-HU" dirty="0" smtClean="0"/>
+              <a:t> </a:t>
+            </a:r>
+            <a:r>
+              <a:rPr lang="hu-HU" dirty="0" err="1" smtClean="0"/>
+              <a:t>from</a:t>
+            </a:r>
+            <a:r>
+              <a:rPr lang="hu-HU" dirty="0" smtClean="0"/>
+              <a:t> </a:t>
+            </a:r>
+            <a:r>
+              <a:rPr lang="hu-HU" dirty="0" err="1" smtClean="0"/>
+              <a:t>data</a:t>
+            </a:r>
+            <a:r>
+              <a:rPr lang="hu-HU" dirty="0" smtClean="0"/>
+              <a:t> </a:t>
+            </a:r>
+            <a:r>
+              <a:rPr lang="hu-HU" dirty="0" err="1" smtClean="0"/>
+              <a:t>sources</a:t>
+            </a:r>
+            <a:r>
+              <a:rPr lang="hu-HU" dirty="0" smtClean="0"/>
+              <a:t> </a:t>
+            </a:r>
+            <a:r>
+              <a:rPr lang="hu-HU" dirty="0" err="1" smtClean="0"/>
+              <a:t>or</a:t>
+            </a:r>
+            <a:r>
+              <a:rPr lang="hu-HU" dirty="0" smtClean="0"/>
+              <a:t> </a:t>
+            </a:r>
+            <a:r>
+              <a:rPr lang="hu-HU" dirty="0" err="1" smtClean="0"/>
+              <a:t>event</a:t>
+            </a:r>
+            <a:r>
+              <a:rPr lang="hu-HU" dirty="0" smtClean="0"/>
+              <a:t> </a:t>
+            </a:r>
+            <a:r>
+              <a:rPr lang="hu-HU" dirty="0" err="1" smtClean="0"/>
+              <a:t>sources</a:t>
+            </a:r>
+            <a:endParaRPr lang="hu-HU" dirty="0" smtClean="0"/>
+          </a:p>
+          <a:p>
+            <a:endParaRPr lang="hu-HU" dirty="0" smtClean="0"/>
+          </a:p>
+          <a:p>
+            <a:r>
+              <a:rPr lang="hu-HU" dirty="0" err="1"/>
+              <a:t>Ideal</a:t>
+            </a:r>
+            <a:r>
+              <a:rPr lang="hu-HU" dirty="0"/>
+              <a:t> </a:t>
+            </a:r>
+            <a:r>
+              <a:rPr lang="hu-HU" dirty="0" err="1"/>
+              <a:t>for</a:t>
+            </a:r>
+            <a:r>
+              <a:rPr lang="hu-HU" dirty="0"/>
+              <a:t> </a:t>
+            </a:r>
+            <a:r>
+              <a:rPr lang="hu-HU" dirty="0" err="1"/>
+              <a:t>scientific</a:t>
+            </a:r>
+            <a:r>
+              <a:rPr lang="hu-HU" dirty="0"/>
+              <a:t> and GPU </a:t>
+            </a:r>
+            <a:r>
+              <a:rPr lang="hu-HU" dirty="0" err="1"/>
+              <a:t>computations</a:t>
+            </a:r>
+            <a:endParaRPr lang="hu-HU" dirty="0" smtClean="0"/>
           </a:p>
           <a:p>
             <a:endParaRPr lang="hu-HU" dirty="0"/>
           </a:p>
-          <a:p>
-            <a:pPr marL="0" indent="0">
-              <a:buNone/>
-            </a:pPr>
-            <a:r>
-              <a:rPr lang="hu-HU" dirty="0" smtClean="0"/>
-              <a:t>	</a:t>
-            </a:r>
-            <a:r>
-              <a:rPr lang="hu-HU" dirty="0" err="1" smtClean="0"/>
-              <a:t>Machine</a:t>
-            </a:r>
-            <a:r>
-              <a:rPr lang="hu-HU" dirty="0" smtClean="0"/>
-              <a:t> </a:t>
-            </a:r>
-            <a:r>
-              <a:rPr lang="hu-HU" dirty="0" err="1" smtClean="0"/>
-              <a:t>Code</a:t>
-            </a:r>
-            <a:r>
-              <a:rPr lang="hu-HU" dirty="0" smtClean="0"/>
-              <a:t> </a:t>
-            </a:r>
-            <a:r>
-              <a:rPr lang="hu-HU" dirty="0" smtClean="0">
-                <a:sym typeface="Wingdings" panose="05000000000000000000" pitchFamily="2" charset="2"/>
-              </a:rPr>
-              <a:t> Assembly  C  </a:t>
-            </a:r>
-            <a:r>
-              <a:rPr lang="hu-HU" dirty="0" err="1" smtClean="0">
-                <a:sym typeface="Wingdings" panose="05000000000000000000" pitchFamily="2" charset="2"/>
-              </a:rPr>
-              <a:t>C</a:t>
-            </a:r>
-            <a:r>
-              <a:rPr lang="hu-HU" dirty="0" smtClean="0">
-                <a:sym typeface="Wingdings" panose="05000000000000000000" pitchFamily="2" charset="2"/>
-              </a:rPr>
-              <a:t>++  Java  C#</a:t>
-            </a:r>
-          </a:p>
-          <a:p>
-            <a:pPr marL="0" indent="0">
-              <a:buNone/>
-            </a:pPr>
-            <a:endParaRPr lang="hu-HU" dirty="0">
-              <a:sym typeface="Wingdings" panose="05000000000000000000" pitchFamily="2" charset="2"/>
-            </a:endParaRPr>
-          </a:p>
-          <a:p>
-            <a:r>
-              <a:rPr lang="hu-HU" dirty="0" err="1" smtClean="0"/>
-              <a:t>From</a:t>
-            </a:r>
-            <a:r>
-              <a:rPr lang="hu-HU" dirty="0" smtClean="0"/>
-              <a:t> </a:t>
-            </a:r>
-            <a:r>
-              <a:rPr lang="hu-HU" dirty="0" err="1" smtClean="0"/>
-              <a:t>scientific</a:t>
-            </a:r>
-            <a:r>
-              <a:rPr lang="hu-HU" dirty="0" smtClean="0"/>
-              <a:t> </a:t>
-            </a:r>
-            <a:r>
-              <a:rPr lang="hu-HU" dirty="0" err="1" smtClean="0"/>
-              <a:t>side</a:t>
-            </a:r>
-            <a:r>
-              <a:rPr lang="hu-HU" dirty="0" smtClean="0"/>
-              <a:t> (</a:t>
-            </a:r>
-            <a:r>
-              <a:rPr lang="el-GR" dirty="0"/>
-              <a:t>λ</a:t>
-            </a:r>
-            <a:r>
-              <a:rPr lang="hu-HU" dirty="0" err="1" smtClean="0"/>
-              <a:t>-calculus</a:t>
-            </a:r>
-            <a:r>
-              <a:rPr lang="hu-HU" dirty="0" smtClean="0"/>
-              <a:t>, </a:t>
-            </a:r>
-            <a:r>
-              <a:rPr lang="hu-HU" dirty="0" err="1" smtClean="0"/>
-              <a:t>Alonzo</a:t>
-            </a:r>
-            <a:r>
-              <a:rPr lang="hu-HU" dirty="0" smtClean="0"/>
-              <a:t> </a:t>
-            </a:r>
-            <a:r>
-              <a:rPr lang="hu-HU" dirty="0" err="1"/>
-              <a:t>Church</a:t>
-            </a:r>
-            <a:r>
-              <a:rPr lang="hu-HU" dirty="0"/>
-              <a:t>, 1930s)</a:t>
-            </a:r>
-            <a:endParaRPr lang="hu-HU" dirty="0" smtClean="0"/>
-          </a:p>
-          <a:p>
-            <a:endParaRPr lang="hu-HU" dirty="0"/>
-          </a:p>
-          <a:p>
-            <a:pPr marL="0" indent="0">
-              <a:buNone/>
-            </a:pPr>
-            <a:r>
-              <a:rPr lang="hu-HU" dirty="0" smtClean="0"/>
-              <a:t>	</a:t>
-            </a:r>
-            <a:r>
-              <a:rPr lang="hu-HU" dirty="0" smtClean="0">
+        </p:txBody>
+      </p:sp>
+      <p:sp>
+        <p:nvSpPr>
+          <p:cNvPr id="5" name="AutoShape 4" descr="{\displaystyle (x,y)\mapsto x^{2}+y^{2}}"/>
+          <p:cNvSpPr>
+            <a:spLocks noChangeAspect="1" noChangeArrowheads="1"/>
+          </p:cNvSpPr>
+          <p:nvPr/>
+        </p:nvSpPr>
+        <p:spPr bwMode="auto">
+          <a:xfrm>
+            <a:off x="307975" y="7937"/>
+            <a:ext cx="304800" cy="304801"/>
+          </a:xfrm>
+          <a:prstGeom prst="rect">
+            <a:avLst/>
+          </a:prstGeom>
+          <a:noFill/>
+          <a:extLst>
+            <a:ext uri="{909E8E84-426E-40DD-AFC4-6F175D3DCCD1}">
+              <a14:hiddenFill xmlns:a14="http://schemas.microsoft.com/office/drawing/2010/main">
                 <a:solidFill>
-                  <a:schemeClr val="bg1">
-                    <a:lumMod val="75000"/>
-                  </a:schemeClr>
+                  <a:srgbClr val="FFFFFF"/>
                 </a:solidFill>
-                <a:sym typeface="Wingdings" panose="05000000000000000000" pitchFamily="2" charset="2"/>
-              </a:rPr>
-              <a:t>IPL  LISP </a:t>
-            </a:r>
-            <a:r>
-              <a:rPr lang="hu-HU" dirty="0" smtClean="0"/>
-              <a:t> ML </a:t>
-            </a:r>
-            <a:r>
-              <a:rPr lang="hu-HU" dirty="0" smtClean="0">
-                <a:sym typeface="Wingdings" panose="05000000000000000000" pitchFamily="2" charset="2"/>
-              </a:rPr>
-              <a:t> SML  </a:t>
-            </a:r>
-            <a:r>
-              <a:rPr lang="hu-HU" dirty="0" err="1" smtClean="0">
-                <a:sym typeface="Wingdings" panose="05000000000000000000" pitchFamily="2" charset="2"/>
-              </a:rPr>
-              <a:t>Caml</a:t>
-            </a:r>
-            <a:r>
-              <a:rPr lang="hu-HU" dirty="0" smtClean="0">
-                <a:sym typeface="Wingdings" panose="05000000000000000000" pitchFamily="2" charset="2"/>
-              </a:rPr>
-              <a:t>  </a:t>
-            </a:r>
-            <a:r>
-              <a:rPr lang="hu-HU" dirty="0" err="1" smtClean="0">
-                <a:sym typeface="Wingdings" panose="05000000000000000000" pitchFamily="2" charset="2"/>
-              </a:rPr>
-              <a:t>OCaml</a:t>
-            </a:r>
-            <a:r>
-              <a:rPr lang="hu-HU" dirty="0" smtClean="0">
-                <a:sym typeface="Wingdings" panose="05000000000000000000" pitchFamily="2" charset="2"/>
-              </a:rPr>
-              <a:t>  F#</a:t>
-            </a:r>
-            <a:endParaRPr lang="en-US" dirty="0"/>
+              </a14:hiddenFill>
+            </a:ext>
+          </a:extLst>
+        </p:spPr>
+        <p:txBody>
+          <a:bodyPr vert="horz" wrap="square" lIns="91440" tIns="45720" rIns="91440" bIns="45720" numCol="1" anchor="t" anchorCtr="0" compatLnSpc="1">
+            <a:prstTxWarp prst="textNoShape">
+              <a:avLst/>
+            </a:prstTxWarp>
+          </a:bodyPr>
+          <a:lstStyle/>
+          <a:p>
+            <a:endParaRPr lang="en-US"/>
           </a:p>
         </p:txBody>
       </p:sp>
     </p:spTree>
     <p:extLst>
       <p:ext uri="{BB962C8B-B14F-4D97-AF65-F5344CB8AC3E}">
-        <p14:creationId xmlns:p14="http://schemas.microsoft.com/office/powerpoint/2010/main" val="1122456483"/>
+        <p14:creationId xmlns:p14="http://schemas.microsoft.com/office/powerpoint/2010/main" val="3711913152"/>
       </p:ext>
     </p:extLst>
   </p:cSld>
@@ -3890,460 +4219,6 @@
           <a:lstStyle/>
           <a:p>
             <a:r>
-              <a:rPr lang="hu-HU" dirty="0" err="1" smtClean="0"/>
-              <a:t>Functional</a:t>
-            </a:r>
-            <a:r>
-              <a:rPr lang="hu-HU" dirty="0" smtClean="0"/>
-              <a:t> </a:t>
-            </a:r>
-            <a:r>
-              <a:rPr lang="hu-HU" dirty="0" err="1" smtClean="0"/>
-              <a:t>programming</a:t>
-            </a:r>
-            <a:endParaRPr lang="en-US" dirty="0"/>
-          </a:p>
-        </p:txBody>
-      </p:sp>
-      <p:sp>
-        <p:nvSpPr>
-          <p:cNvPr id="3" name="Content Placeholder 2"/>
-          <p:cNvSpPr>
-            <a:spLocks noGrp="1"/>
-          </p:cNvSpPr>
-          <p:nvPr>
-            <p:ph idx="1"/>
-          </p:nvPr>
-        </p:nvSpPr>
-        <p:spPr/>
-        <p:txBody>
-          <a:bodyPr>
-            <a:normAutofit/>
-          </a:bodyPr>
-          <a:lstStyle/>
-          <a:p>
-            <a:r>
-              <a:rPr lang="hu-HU" dirty="0" err="1" smtClean="0"/>
-              <a:t>Functions</a:t>
-            </a:r>
-            <a:r>
-              <a:rPr lang="hu-HU" dirty="0" smtClean="0"/>
-              <a:t> </a:t>
-            </a:r>
-            <a:r>
-              <a:rPr lang="hu-HU" dirty="0" err="1" smtClean="0"/>
-              <a:t>are</a:t>
-            </a:r>
-            <a:r>
-              <a:rPr lang="hu-HU" dirty="0" smtClean="0"/>
-              <a:t> </a:t>
-            </a:r>
-            <a:r>
-              <a:rPr lang="hu-HU" dirty="0" err="1" smtClean="0"/>
-              <a:t>first-class</a:t>
-            </a:r>
-            <a:r>
-              <a:rPr lang="hu-HU" dirty="0" smtClean="0"/>
-              <a:t> </a:t>
-            </a:r>
-            <a:r>
-              <a:rPr lang="hu-HU" dirty="0" err="1" smtClean="0"/>
-              <a:t>citizens</a:t>
-            </a:r>
-            <a:endParaRPr lang="hu-HU" dirty="0" smtClean="0"/>
-          </a:p>
-          <a:p>
-            <a:r>
-              <a:rPr lang="hu-HU" dirty="0"/>
-              <a:t>Data is </a:t>
-            </a:r>
-            <a:r>
-              <a:rPr lang="hu-HU" dirty="0" err="1"/>
-              <a:t>immutable</a:t>
-            </a:r>
-            <a:r>
-              <a:rPr lang="hu-HU" dirty="0"/>
-              <a:t> </a:t>
-            </a:r>
-            <a:r>
-              <a:rPr lang="hu-HU" dirty="0" err="1"/>
-              <a:t>by</a:t>
-            </a:r>
-            <a:r>
-              <a:rPr lang="hu-HU" dirty="0"/>
-              <a:t> </a:t>
-            </a:r>
-            <a:r>
-              <a:rPr lang="hu-HU" dirty="0" err="1"/>
-              <a:t>default</a:t>
-            </a:r>
-            <a:endParaRPr lang="hu-HU" dirty="0"/>
-          </a:p>
-          <a:p>
-            <a:r>
-              <a:rPr lang="hu-HU" dirty="0" smtClean="0"/>
-              <a:t>The </a:t>
-            </a:r>
-            <a:r>
-              <a:rPr lang="hu-HU" dirty="0" err="1" smtClean="0"/>
-              <a:t>application</a:t>
-            </a:r>
-            <a:r>
-              <a:rPr lang="hu-HU" dirty="0" smtClean="0"/>
-              <a:t> </a:t>
-            </a:r>
-            <a:r>
-              <a:rPr lang="hu-HU" dirty="0" err="1" smtClean="0"/>
-              <a:t>evaluates</a:t>
-            </a:r>
-            <a:r>
-              <a:rPr lang="hu-HU" dirty="0" smtClean="0"/>
-              <a:t> </a:t>
-            </a:r>
-            <a:r>
-              <a:rPr lang="hu-HU" dirty="0" err="1" smtClean="0"/>
-              <a:t>expressions</a:t>
-            </a:r>
-            <a:r>
-              <a:rPr lang="hu-HU" dirty="0" smtClean="0"/>
-              <a:t>, </a:t>
-            </a:r>
-            <a:r>
-              <a:rPr lang="hu-HU" dirty="0" err="1" smtClean="0"/>
-              <a:t>functions</a:t>
-            </a:r>
-            <a:r>
-              <a:rPr lang="hu-HU" dirty="0" smtClean="0"/>
-              <a:t> and </a:t>
-            </a:r>
-            <a:r>
-              <a:rPr lang="hu-HU" dirty="0" err="1" smtClean="0"/>
-              <a:t>returns</a:t>
-            </a:r>
-            <a:r>
-              <a:rPr lang="hu-HU" dirty="0" smtClean="0"/>
-              <a:t> </a:t>
-            </a:r>
-            <a:r>
-              <a:rPr lang="hu-HU" dirty="0" err="1" smtClean="0"/>
-              <a:t>the</a:t>
-            </a:r>
-            <a:r>
-              <a:rPr lang="hu-HU" dirty="0" smtClean="0"/>
-              <a:t> </a:t>
-            </a:r>
-            <a:r>
-              <a:rPr lang="hu-HU" dirty="0" err="1" smtClean="0"/>
-              <a:t>result</a:t>
-            </a:r>
-            <a:endParaRPr lang="hu-HU" dirty="0" smtClean="0"/>
-          </a:p>
-          <a:p>
-            <a:pPr lvl="1"/>
-            <a:r>
-              <a:rPr lang="hu-HU" dirty="0" err="1" smtClean="0"/>
-              <a:t>Transforms</a:t>
-            </a:r>
-            <a:r>
-              <a:rPr lang="hu-HU" dirty="0" smtClean="0"/>
-              <a:t> </a:t>
-            </a:r>
-            <a:r>
-              <a:rPr lang="hu-HU" dirty="0" err="1" smtClean="0"/>
-              <a:t>the</a:t>
-            </a:r>
-            <a:r>
-              <a:rPr lang="hu-HU" dirty="0" smtClean="0"/>
-              <a:t> </a:t>
-            </a:r>
-            <a:r>
-              <a:rPr lang="hu-HU" dirty="0" err="1" smtClean="0"/>
-              <a:t>immutable</a:t>
-            </a:r>
-            <a:r>
-              <a:rPr lang="hu-HU" dirty="0" smtClean="0"/>
-              <a:t> </a:t>
-            </a:r>
-            <a:r>
-              <a:rPr lang="hu-HU" dirty="0" err="1" smtClean="0"/>
-              <a:t>state</a:t>
-            </a:r>
-            <a:r>
-              <a:rPr lang="hu-HU" dirty="0" smtClean="0"/>
-              <a:t> </a:t>
-            </a:r>
-            <a:r>
-              <a:rPr lang="hu-HU" dirty="0" err="1" smtClean="0"/>
-              <a:t>to</a:t>
-            </a:r>
-            <a:r>
-              <a:rPr lang="hu-HU" dirty="0" smtClean="0"/>
-              <a:t> a </a:t>
-            </a:r>
-            <a:r>
-              <a:rPr lang="hu-HU" dirty="0" err="1" smtClean="0"/>
-              <a:t>new</a:t>
-            </a:r>
-            <a:r>
-              <a:rPr lang="hu-HU" dirty="0" smtClean="0"/>
-              <a:t> </a:t>
-            </a:r>
-            <a:r>
-              <a:rPr lang="hu-HU" dirty="0" err="1" smtClean="0"/>
-              <a:t>state</a:t>
-            </a:r>
-            <a:endParaRPr lang="hu-HU" dirty="0" smtClean="0"/>
-          </a:p>
-          <a:p>
-            <a:pPr lvl="1"/>
-            <a:r>
-              <a:rPr lang="hu-HU" dirty="0" err="1" smtClean="0"/>
-              <a:t>Functions</a:t>
-            </a:r>
-            <a:r>
-              <a:rPr lang="hu-HU" dirty="0" smtClean="0"/>
-              <a:t> </a:t>
-            </a:r>
-            <a:r>
-              <a:rPr lang="hu-HU" dirty="0" err="1" smtClean="0"/>
-              <a:t>don’t</a:t>
-            </a:r>
-            <a:r>
-              <a:rPr lang="hu-HU" dirty="0" smtClean="0"/>
-              <a:t> </a:t>
-            </a:r>
-            <a:r>
-              <a:rPr lang="hu-HU" dirty="0" err="1" smtClean="0"/>
-              <a:t>have</a:t>
-            </a:r>
-            <a:r>
-              <a:rPr lang="hu-HU" dirty="0" smtClean="0"/>
-              <a:t> </a:t>
-            </a:r>
-            <a:r>
-              <a:rPr lang="hu-HU" dirty="0" err="1" smtClean="0"/>
-              <a:t>any</a:t>
-            </a:r>
-            <a:r>
-              <a:rPr lang="hu-HU" dirty="0" smtClean="0"/>
-              <a:t> </a:t>
-            </a:r>
-            <a:r>
-              <a:rPr lang="hu-HU" dirty="0" err="1" smtClean="0"/>
-              <a:t>side</a:t>
-            </a:r>
-            <a:r>
-              <a:rPr lang="hu-HU" dirty="0" smtClean="0"/>
-              <a:t> </a:t>
-            </a:r>
-            <a:r>
-              <a:rPr lang="hu-HU" dirty="0" err="1" smtClean="0"/>
-              <a:t>effects</a:t>
-            </a:r>
-            <a:endParaRPr lang="hu-HU" dirty="0" smtClean="0"/>
-          </a:p>
-          <a:p>
-            <a:r>
-              <a:rPr lang="hu-HU" dirty="0" err="1" smtClean="0"/>
-              <a:t>Information</a:t>
-            </a:r>
-            <a:r>
-              <a:rPr lang="hu-HU" dirty="0" smtClean="0"/>
-              <a:t> </a:t>
-            </a:r>
-            <a:r>
-              <a:rPr lang="hu-HU" dirty="0" err="1" smtClean="0"/>
-              <a:t>can</a:t>
-            </a:r>
-            <a:r>
-              <a:rPr lang="hu-HU" dirty="0" smtClean="0"/>
-              <a:t> </a:t>
-            </a:r>
-            <a:r>
-              <a:rPr lang="hu-HU" dirty="0" err="1" smtClean="0"/>
-              <a:t>come</a:t>
-            </a:r>
-            <a:r>
-              <a:rPr lang="hu-HU" dirty="0" smtClean="0"/>
-              <a:t> </a:t>
-            </a:r>
-            <a:r>
-              <a:rPr lang="hu-HU" dirty="0" err="1" smtClean="0"/>
-              <a:t>from</a:t>
-            </a:r>
-            <a:r>
-              <a:rPr lang="hu-HU" dirty="0" smtClean="0"/>
-              <a:t> </a:t>
-            </a:r>
-            <a:r>
-              <a:rPr lang="hu-HU" dirty="0" err="1" smtClean="0"/>
-              <a:t>data</a:t>
-            </a:r>
-            <a:r>
-              <a:rPr lang="hu-HU" dirty="0" smtClean="0"/>
-              <a:t> </a:t>
-            </a:r>
-            <a:r>
-              <a:rPr lang="hu-HU" dirty="0" err="1" smtClean="0"/>
-              <a:t>sources</a:t>
-            </a:r>
-            <a:r>
-              <a:rPr lang="hu-HU" dirty="0" smtClean="0"/>
-              <a:t> </a:t>
-            </a:r>
-            <a:r>
-              <a:rPr lang="hu-HU" dirty="0" err="1" smtClean="0"/>
-              <a:t>or</a:t>
-            </a:r>
-            <a:r>
-              <a:rPr lang="hu-HU" dirty="0" smtClean="0"/>
-              <a:t> </a:t>
-            </a:r>
-            <a:r>
-              <a:rPr lang="hu-HU" dirty="0" err="1" smtClean="0"/>
-              <a:t>event</a:t>
-            </a:r>
-            <a:r>
-              <a:rPr lang="hu-HU" dirty="0" smtClean="0"/>
-              <a:t> </a:t>
-            </a:r>
-            <a:r>
-              <a:rPr lang="hu-HU" dirty="0" err="1" smtClean="0"/>
-              <a:t>sources</a:t>
-            </a:r>
-            <a:endParaRPr lang="hu-HU" dirty="0" smtClean="0"/>
-          </a:p>
-          <a:p>
-            <a:endParaRPr lang="hu-HU" dirty="0" smtClean="0"/>
-          </a:p>
-          <a:p>
-            <a:r>
-              <a:rPr lang="hu-HU" dirty="0" err="1"/>
-              <a:t>Ideal</a:t>
-            </a:r>
-            <a:r>
-              <a:rPr lang="hu-HU" dirty="0"/>
-              <a:t> </a:t>
-            </a:r>
-            <a:r>
-              <a:rPr lang="hu-HU" dirty="0" err="1"/>
-              <a:t>for</a:t>
-            </a:r>
-            <a:r>
-              <a:rPr lang="hu-HU" dirty="0"/>
-              <a:t> </a:t>
-            </a:r>
-            <a:r>
-              <a:rPr lang="hu-HU" dirty="0" err="1"/>
-              <a:t>scientific</a:t>
-            </a:r>
-            <a:r>
-              <a:rPr lang="hu-HU" dirty="0"/>
-              <a:t> and GPU </a:t>
-            </a:r>
-            <a:r>
-              <a:rPr lang="hu-HU" dirty="0" err="1"/>
-              <a:t>computations</a:t>
-            </a:r>
-            <a:endParaRPr lang="hu-HU" dirty="0" smtClean="0"/>
-          </a:p>
-          <a:p>
-            <a:endParaRPr lang="hu-HU" dirty="0"/>
-          </a:p>
-        </p:txBody>
-      </p:sp>
-      <p:sp>
-        <p:nvSpPr>
-          <p:cNvPr id="5" name="AutoShape 4" descr="{\displaystyle (x,y)\mapsto x^{2}+y^{2}}"/>
-          <p:cNvSpPr>
-            <a:spLocks noChangeAspect="1" noChangeArrowheads="1"/>
-          </p:cNvSpPr>
-          <p:nvPr/>
-        </p:nvSpPr>
-        <p:spPr bwMode="auto">
-          <a:xfrm>
-            <a:off x="307975" y="7937"/>
-            <a:ext cx="304800" cy="304801"/>
-          </a:xfrm>
-          <a:prstGeom prst="rect">
-            <a:avLst/>
-          </a:prstGeom>
-          <a:noFill/>
-          <a:extLst>
-            <a:ext uri="{909E8E84-426E-40DD-AFC4-6F175D3DCCD1}">
-              <a14:hiddenFill xmlns:a14="http://schemas.microsoft.com/office/drawing/2010/main">
-                <a:solidFill>
-                  <a:srgbClr val="FFFFFF"/>
-                </a:solidFill>
-              </a14:hiddenFill>
-            </a:ext>
-          </a:extLst>
-        </p:spPr>
-        <p:txBody>
-          <a:bodyPr vert="horz" wrap="square" lIns="91440" tIns="45720" rIns="91440" bIns="45720" numCol="1" anchor="t" anchorCtr="0" compatLnSpc="1">
-            <a:prstTxWarp prst="textNoShape">
-              <a:avLst/>
-            </a:prstTxWarp>
-          </a:bodyPr>
-          <a:lstStyle/>
-          <a:p>
-            <a:endParaRPr lang="en-US"/>
-          </a:p>
-        </p:txBody>
-      </p:sp>
-    </p:spTree>
-    <p:extLst>
-      <p:ext uri="{BB962C8B-B14F-4D97-AF65-F5344CB8AC3E}">
-        <p14:creationId xmlns:p14="http://schemas.microsoft.com/office/powerpoint/2010/main" val="3711913152"/>
-      </p:ext>
-    </p:extLst>
-  </p:cSld>
-  <p:clrMapOvr>
-    <a:masterClrMapping/>
-  </p:clrMapOvr>
-  <p:timing>
-    <p:tnLst>
-      <p:par>
-        <p:cTn id="1" dur="indefinite" restart="never" nodeType="tmRoot"/>
-      </p:par>
-    </p:tnLst>
-  </p:timing>
-</p:sld>
-</file>
-
-<file path=ppt/slides/slide6.xml><?xml version="1.0" encoding="utf-8"?>
-<p:sld xmlns:a="http://schemas.openxmlformats.org/drawingml/2006/main" xmlns:r="http://schemas.openxmlformats.org/officeDocument/2006/relationships" xmlns:p="http://schemas.openxmlformats.org/presentationml/2006/main">
-  <p:cSld>
-    <p:spTree>
-      <p:nvGrpSpPr>
-        <p:cNvPr id="1" name=""/>
-        <p:cNvGrpSpPr/>
-        <p:nvPr/>
-      </p:nvGrpSpPr>
-      <p:grpSpPr>
-        <a:xfrm>
-          <a:off x="0" y="0"/>
-          <a:ext cx="0" cy="0"/>
-          <a:chOff x="0" y="0"/>
-          <a:chExt cx="0" cy="0"/>
-        </a:xfrm>
-      </p:grpSpPr>
-      <p:sp>
-        <p:nvSpPr>
-          <p:cNvPr id="2" name="Title 1"/>
-          <p:cNvSpPr>
-            <a:spLocks noGrp="1"/>
-          </p:cNvSpPr>
-          <p:nvPr>
-            <p:ph type="title"/>
-          </p:nvPr>
-        </p:nvSpPr>
-        <p:spPr/>
-        <p:txBody>
-          <a:bodyPr/>
-          <a:lstStyle/>
-          <a:p>
-            <a:r>
               <a:rPr lang="hu-HU" dirty="0" smtClean="0"/>
               <a:t>Don </a:t>
             </a:r>
@@ -4541,7 +4416,7 @@
 </p:sld>
 </file>
 
-<file path=ppt/slides/slide7.xml><?xml version="1.0" encoding="utf-8"?>
+<file path=ppt/slides/slide6.xml><?xml version="1.0" encoding="utf-8"?>
 <p:sld xmlns:a="http://schemas.openxmlformats.org/drawingml/2006/main" xmlns:r="http://schemas.openxmlformats.org/officeDocument/2006/relationships" xmlns:p="http://schemas.openxmlformats.org/presentationml/2006/main">
   <p:cSld>
     <p:spTree>

</xml_diff>